<commit_message>
#521: Implementing a Grammar Tests fo parsing times. Reviewing CUP Grammar to make it pass.
</commit_message>
<xml_diff>
--- a/TypeCobol_Stk/TypeCobol.DocumentModel/Documents/POC TypeCOBOL DOM.pptx
+++ b/TypeCobol_Stk/TypeCobol.DocumentModel/Documents/POC TypeCOBOL DOM.pptx
@@ -16322,7 +16322,19 @@
             </a:pPr>
             <a:r>
               <a:rPr lang="fr-FR" dirty="0" smtClean="0"/>
-              <a:t>Un type peut faire référencé a un symbole associé.</a:t>
+              <a:t>Un type peut </a:t>
+            </a:r>
+            <a:r>
+              <a:rPr lang="fr-FR" smtClean="0"/>
+              <a:t>faire </a:t>
+            </a:r>
+            <a:r>
+              <a:rPr lang="fr-FR" smtClean="0"/>
+              <a:t>référence </a:t>
+            </a:r>
+            <a:r>
+              <a:rPr lang="fr-FR" dirty="0" smtClean="0"/>
+              <a:t>a un symbole associé.</a:t>
             </a:r>
           </a:p>
           <a:p>

</xml_diff>